<commit_message>
Update P.E.A.R. by Amazing Whack Services.pptx
</commit_message>
<xml_diff>
--- a/P.E.A.R. by Amazing Whack Services.pptx
+++ b/P.E.A.R. by Amazing Whack Services.pptx
@@ -730,7 +730,14 @@
               <a:tabLst/>
               <a:defRPr/>
             </a:pPr>
-            <a:endParaRPr lang="en-SG" dirty="0"/>
+            <a:r>
+              <a:rPr lang="en-SG" dirty="0"/>
+              <a:t>Visit our website: </a:t>
+            </a:r>
+            <a:r>
+              <a:rPr lang="en-SG" sz="1200" dirty="0"/>
+              <a:t>http://www.amazing-whack-services.codes</a:t>
+            </a:r>
           </a:p>
         </p:txBody>
       </p:sp>
@@ -8694,7 +8701,7 @@
           <a:lstStyle/>
           <a:p>
             <a:r>
-              <a:rPr lang="en-SG">
+              <a:rPr lang="en-SG" dirty="0">
                 <a:solidFill>
                   <a:srgbClr val="FFFFFF"/>
                 </a:solidFill>
@@ -8704,7 +8711,7 @@
           </a:p>
           <a:p>
             <a:r>
-              <a:rPr lang="en-SG" sz="1800"/>
+              <a:rPr lang="en-SG" sz="1800" dirty="0"/>
               <a:t>Edwin Lim | Javier Wong | Jonathan Lee | Leonard Tan | Ong Hui Fen</a:t>
             </a:r>
           </a:p>
@@ -9029,6 +9036,43 @@
           </a:extLst>
         </p:spPr>
       </p:pic>
+      <p:sp>
+        <p:nvSpPr>
+          <p:cNvPr id="11" name="TextBox 10">
+            <a:extLst>
+              <a:ext uri="{FF2B5EF4-FFF2-40B4-BE49-F238E27FC236}">
+                <a16:creationId xmlns:a16="http://schemas.microsoft.com/office/drawing/2014/main" id="{EDA8C5AA-C911-4199-96A7-B6D77AE225BA}"/>
+              </a:ext>
+            </a:extLst>
+          </p:cNvPr>
+          <p:cNvSpPr txBox="1"/>
+          <p:nvPr/>
+        </p:nvSpPr>
+        <p:spPr>
+          <a:xfrm>
+            <a:off x="1665586" y="3718356"/>
+            <a:ext cx="4399171" cy="338554"/>
+          </a:xfrm>
+          <a:prstGeom prst="rect">
+            <a:avLst/>
+          </a:prstGeom>
+          <a:solidFill>
+            <a:srgbClr val="B8F2E0"/>
+          </a:solidFill>
+        </p:spPr>
+        <p:txBody>
+          <a:bodyPr wrap="square">
+            <a:spAutoFit/>
+          </a:bodyPr>
+          <a:lstStyle/>
+          <a:p>
+            <a:r>
+              <a:rPr lang="en-SG" sz="1600" dirty="0"/>
+              <a:t>Visit Us: http://www.amazing-whack-services.codes</a:t>
+            </a:r>
+          </a:p>
+        </p:txBody>
+      </p:sp>
     </p:spTree>
     <p:extLst>
       <p:ext uri="{BB962C8B-B14F-4D97-AF65-F5344CB8AC3E}">
@@ -9039,11 +9083,11 @@
   <p:clrMapOvr>
     <a:masterClrMapping/>
   </p:clrMapOvr>
-  <mc:AlternateContent xmlns:mc="http://schemas.openxmlformats.org/markup-compatibility/2006">
-    <mc:Choice xmlns:p14="http://schemas.microsoft.com/office/powerpoint/2010/main" Requires="p14">
+  <mc:AlternateContent xmlns:mc="http://schemas.openxmlformats.org/markup-compatibility/2006" xmlns:p14="http://schemas.microsoft.com/office/powerpoint/2010/main">
+    <mc:Choice Requires="p14">
       <p:transition spd="slow" p14:dur="2000" advTm="3730"/>
     </mc:Choice>
-    <mc:Fallback>
+    <mc:Fallback xmlns="">
       <p:transition spd="slow" advTm="3730"/>
     </mc:Fallback>
   </mc:AlternateContent>
@@ -10400,11 +10444,11 @@
   <p:clrMapOvr>
     <a:masterClrMapping/>
   </p:clrMapOvr>
-  <mc:AlternateContent xmlns:mc="http://schemas.openxmlformats.org/markup-compatibility/2006">
-    <mc:Choice xmlns:p14="http://schemas.microsoft.com/office/powerpoint/2010/main" Requires="p14">
+  <mc:AlternateContent xmlns:mc="http://schemas.openxmlformats.org/markup-compatibility/2006" xmlns:p14="http://schemas.microsoft.com/office/powerpoint/2010/main">
+    <mc:Choice Requires="p14">
       <p:transition spd="slow" p14:dur="2000" advTm="12102"/>
     </mc:Choice>
-    <mc:Fallback>
+    <mc:Fallback xmlns="">
       <p:transition spd="slow" advTm="12102"/>
     </mc:Fallback>
   </mc:AlternateContent>
@@ -12791,11 +12835,11 @@
   <p:clrMapOvr>
     <a:masterClrMapping/>
   </p:clrMapOvr>
-  <mc:AlternateContent xmlns:mc="http://schemas.openxmlformats.org/markup-compatibility/2006">
-    <mc:Choice xmlns:p14="http://schemas.microsoft.com/office/powerpoint/2010/main" Requires="p14">
+  <mc:AlternateContent xmlns:mc="http://schemas.openxmlformats.org/markup-compatibility/2006" xmlns:p14="http://schemas.microsoft.com/office/powerpoint/2010/main">
+    <mc:Choice Requires="p14">
       <p:transition spd="slow" p14:dur="2000" advTm="33184"/>
     </mc:Choice>
-    <mc:Fallback>
+    <mc:Fallback xmlns="">
       <p:transition spd="slow" advTm="33184"/>
     </mc:Fallback>
   </mc:AlternateContent>
@@ -14522,11 +14566,11 @@
   <p:clrMapOvr>
     <a:masterClrMapping/>
   </p:clrMapOvr>
-  <mc:AlternateContent xmlns:mc="http://schemas.openxmlformats.org/markup-compatibility/2006">
-    <mc:Choice xmlns:p14="http://schemas.microsoft.com/office/powerpoint/2010/main" Requires="p14">
+  <mc:AlternateContent xmlns:mc="http://schemas.openxmlformats.org/markup-compatibility/2006" xmlns:p14="http://schemas.microsoft.com/office/powerpoint/2010/main">
+    <mc:Choice Requires="p14">
       <p:transition spd="slow" p14:dur="2000" advTm="33490"/>
     </mc:Choice>
-    <mc:Fallback>
+    <mc:Fallback xmlns="">
       <p:transition spd="slow" advTm="33490"/>
     </mc:Fallback>
   </mc:AlternateContent>
@@ -14870,11 +14914,11 @@
   <p:clrMapOvr>
     <a:masterClrMapping/>
   </p:clrMapOvr>
-  <mc:AlternateContent xmlns:mc="http://schemas.openxmlformats.org/markup-compatibility/2006">
-    <mc:Choice xmlns:p14="http://schemas.microsoft.com/office/powerpoint/2010/main" Requires="p14">
+  <mc:AlternateContent xmlns:mc="http://schemas.openxmlformats.org/markup-compatibility/2006" xmlns:p14="http://schemas.microsoft.com/office/powerpoint/2010/main">
+    <mc:Choice Requires="p14">
       <p:transition spd="slow" p14:dur="2000" advTm="1789"/>
     </mc:Choice>
-    <mc:Fallback>
+    <mc:Fallback xmlns="">
       <p:transition spd="slow" advTm="1789"/>
     </mc:Fallback>
   </mc:AlternateContent>
@@ -16535,11 +16579,11 @@
   <p:clrMapOvr>
     <a:masterClrMapping/>
   </p:clrMapOvr>
-  <mc:AlternateContent xmlns:mc="http://schemas.openxmlformats.org/markup-compatibility/2006">
-    <mc:Choice xmlns:p14="http://schemas.microsoft.com/office/powerpoint/2010/main" Requires="p14">
+  <mc:AlternateContent xmlns:mc="http://schemas.openxmlformats.org/markup-compatibility/2006" xmlns:p14="http://schemas.microsoft.com/office/powerpoint/2010/main">
+    <mc:Choice Requires="p14">
       <p:transition spd="slow" p14:dur="2000" advTm="32524"/>
     </mc:Choice>
-    <mc:Fallback>
+    <mc:Fallback xmlns="">
       <p:transition spd="slow" advTm="32524"/>
     </mc:Fallback>
   </mc:AlternateContent>
@@ -17901,11 +17945,11 @@
   <p:clrMapOvr>
     <a:masterClrMapping/>
   </p:clrMapOvr>
-  <mc:AlternateContent xmlns:mc="http://schemas.openxmlformats.org/markup-compatibility/2006">
-    <mc:Choice xmlns:p14="http://schemas.microsoft.com/office/powerpoint/2010/main" Requires="p14">
+  <mc:AlternateContent xmlns:mc="http://schemas.openxmlformats.org/markup-compatibility/2006" xmlns:p14="http://schemas.microsoft.com/office/powerpoint/2010/main">
+    <mc:Choice Requires="p14">
       <p:transition spd="slow" p14:dur="2000" advTm="17730"/>
     </mc:Choice>
-    <mc:Fallback>
+    <mc:Fallback xmlns="">
       <p:transition spd="slow" advTm="17730"/>
     </mc:Fallback>
   </mc:AlternateContent>
@@ -18910,11 +18954,11 @@
   <p:clrMapOvr>
     <a:masterClrMapping/>
   </p:clrMapOvr>
-  <mc:AlternateContent xmlns:mc="http://schemas.openxmlformats.org/markup-compatibility/2006">
-    <mc:Choice xmlns:p14="http://schemas.microsoft.com/office/powerpoint/2010/main" Requires="p14">
+  <mc:AlternateContent xmlns:mc="http://schemas.openxmlformats.org/markup-compatibility/2006" xmlns:p14="http://schemas.microsoft.com/office/powerpoint/2010/main">
+    <mc:Choice Requires="p14">
       <p:transition spd="slow" p14:dur="2000" advTm="19392"/>
     </mc:Choice>
-    <mc:Fallback>
+    <mc:Fallback xmlns="">
       <p:transition spd="slow" advTm="19392"/>
     </mc:Fallback>
   </mc:AlternateContent>
@@ -20273,11 +20317,11 @@
   <p:clrMapOvr>
     <a:masterClrMapping/>
   </p:clrMapOvr>
-  <mc:AlternateContent xmlns:mc="http://schemas.openxmlformats.org/markup-compatibility/2006">
-    <mc:Choice xmlns:p14="http://schemas.microsoft.com/office/powerpoint/2010/main" Requires="p14">
+  <mc:AlternateContent xmlns:mc="http://schemas.openxmlformats.org/markup-compatibility/2006" xmlns:p14="http://schemas.microsoft.com/office/powerpoint/2010/main">
+    <mc:Choice Requires="p14">
       <p:transition spd="slow" p14:dur="2000" advTm="16771"/>
     </mc:Choice>
-    <mc:Fallback>
+    <mc:Fallback xmlns="">
       <p:transition spd="slow" advTm="16771"/>
     </mc:Fallback>
   </mc:AlternateContent>
@@ -21636,11 +21680,11 @@
   <p:clrMapOvr>
     <a:masterClrMapping/>
   </p:clrMapOvr>
-  <mc:AlternateContent xmlns:mc="http://schemas.openxmlformats.org/markup-compatibility/2006">
-    <mc:Choice xmlns:p14="http://schemas.microsoft.com/office/powerpoint/2010/main" Requires="p14">
+  <mc:AlternateContent xmlns:mc="http://schemas.openxmlformats.org/markup-compatibility/2006" xmlns:p14="http://schemas.microsoft.com/office/powerpoint/2010/main">
+    <mc:Choice Requires="p14">
       <p:transition spd="slow" p14:dur="2000" advTm="11599"/>
     </mc:Choice>
-    <mc:Fallback>
+    <mc:Fallback xmlns="">
       <p:transition spd="slow" advTm="11599"/>
     </mc:Fallback>
   </mc:AlternateContent>
@@ -22445,6 +22489,21 @@
 </file>
 
 <file path=customXml/item1.xml><?xml version="1.0" encoding="utf-8"?>
+<?mso-contentType ?>
+<FormTemplates xmlns="http://schemas.microsoft.com/sharepoint/v3/contenttype/forms">
+  <Display>DocumentLibraryForm</Display>
+  <Edit>DocumentLibraryForm</Edit>
+  <New>DocumentLibraryForm</New>
+</FormTemplates>
+</file>
+
+<file path=customXml/item2.xml><?xml version="1.0" encoding="utf-8"?>
+<p:properties xmlns:p="http://schemas.microsoft.com/office/2006/metadata/properties" xmlns:xsi="http://www.w3.org/2001/XMLSchema-instance" xmlns:pc="http://schemas.microsoft.com/office/infopath/2007/PartnerControls">
+  <documentManagement/>
+</p:properties>
+</file>
+
+<file path=customXml/item3.xml><?xml version="1.0" encoding="utf-8"?>
 <ct:contentTypeSchema xmlns:ct="http://schemas.microsoft.com/office/2006/metadata/contentType" xmlns:ma="http://schemas.microsoft.com/office/2006/metadata/properties/metaAttributes" ct:_="" ma:_="" ma:contentTypeName="Document" ma:contentTypeID="0x010100ED077DFD7547DE40BB19C407130BA958" ma:contentTypeVersion="7" ma:contentTypeDescription="Create a new document." ma:contentTypeScope="" ma:versionID="e25e8fa420ec29ab8d19778f8390958c">
   <xsd:schema xmlns:xsd="http://www.w3.org/2001/XMLSchema" xmlns:xs="http://www.w3.org/2001/XMLSchema" xmlns:p="http://schemas.microsoft.com/office/2006/metadata/properties" xmlns:ns3="7d18e092-22ed-4b3a-8134-bef48e64f2c3" xmlns:ns4="146f35c0-5549-4b11-9385-b5bad1d7a6e6" targetNamespace="http://schemas.microsoft.com/office/2006/metadata/properties" ma:root="true" ma:fieldsID="7151216865053415f358d366f71369ed" ns3:_="" ns4:_="">
     <xsd:import namespace="7d18e092-22ed-4b3a-8134-bef48e64f2c3"/>
@@ -22629,22 +22688,32 @@
 </ct:contentTypeSchema>
 </file>
 
-<file path=customXml/item2.xml><?xml version="1.0" encoding="utf-8"?>
-<?mso-contentType ?>
-<FormTemplates xmlns="http://schemas.microsoft.com/sharepoint/v3/contenttype/forms">
-  <Display>DocumentLibraryForm</Display>
-  <Edit>DocumentLibraryForm</Edit>
-  <New>DocumentLibraryForm</New>
-</FormTemplates>
+<file path=customXml/itemProps1.xml><?xml version="1.0" encoding="utf-8"?>
+<ds:datastoreItem xmlns:ds="http://schemas.openxmlformats.org/officeDocument/2006/customXml" ds:itemID="{6C3B1400-8645-4F2D-A6F6-288FF85A9F52}">
+  <ds:schemaRefs>
+    <ds:schemaRef ds:uri="http://schemas.microsoft.com/sharepoint/v3/contenttype/forms"/>
+  </ds:schemaRefs>
+</ds:datastoreItem>
 </file>
 
-<file path=customXml/item3.xml><?xml version="1.0" encoding="utf-8"?>
-<p:properties xmlns:p="http://schemas.microsoft.com/office/2006/metadata/properties" xmlns:xsi="http://www.w3.org/2001/XMLSchema-instance" xmlns:pc="http://schemas.microsoft.com/office/infopath/2007/PartnerControls">
-  <documentManagement/>
-</p:properties>
+<file path=customXml/itemProps2.xml><?xml version="1.0" encoding="utf-8"?>
+<ds:datastoreItem xmlns:ds="http://schemas.openxmlformats.org/officeDocument/2006/customXml" ds:itemID="{ACBA2150-0912-4867-9AC1-4627B4BB09E7}">
+  <ds:schemaRefs>
+    <ds:schemaRef ds:uri="http://schemas.openxmlformats.org/package/2006/metadata/core-properties"/>
+    <ds:schemaRef ds:uri="146f35c0-5549-4b11-9385-b5bad1d7a6e6"/>
+    <ds:schemaRef ds:uri="http://schemas.microsoft.com/office/2006/documentManagement/types"/>
+    <ds:schemaRef ds:uri="7d18e092-22ed-4b3a-8134-bef48e64f2c3"/>
+    <ds:schemaRef ds:uri="http://purl.org/dc/elements/1.1/"/>
+    <ds:schemaRef ds:uri="http://schemas.microsoft.com/office/2006/metadata/properties"/>
+    <ds:schemaRef ds:uri="http://purl.org/dc/terms/"/>
+    <ds:schemaRef ds:uri="http://schemas.microsoft.com/office/infopath/2007/PartnerControls"/>
+    <ds:schemaRef ds:uri="http://www.w3.org/XML/1998/namespace"/>
+    <ds:schemaRef ds:uri="http://purl.org/dc/dcmitype/"/>
+  </ds:schemaRefs>
+</ds:datastoreItem>
 </file>
 
-<file path=customXml/itemProps1.xml><?xml version="1.0" encoding="utf-8"?>
+<file path=customXml/itemProps3.xml><?xml version="1.0" encoding="utf-8"?>
 <ds:datastoreItem xmlns:ds="http://schemas.openxmlformats.org/officeDocument/2006/customXml" ds:itemID="{88EA551D-A64D-41DF-8DD2-26C4262686BF}">
   <ds:schemaRefs>
     <ds:schemaRef ds:uri="146f35c0-5549-4b11-9385-b5bad1d7a6e6"/>
@@ -22661,29 +22730,4 @@
     <ds:schemaRef ds:uri="http://www.w3.org/2001/XMLSchema"/>
   </ds:schemaRefs>
 </ds:datastoreItem>
-</file>
-
-<file path=customXml/itemProps2.xml><?xml version="1.0" encoding="utf-8"?>
-<ds:datastoreItem xmlns:ds="http://schemas.openxmlformats.org/officeDocument/2006/customXml" ds:itemID="{6C3B1400-8645-4F2D-A6F6-288FF85A9F52}">
-  <ds:schemaRefs>
-    <ds:schemaRef ds:uri="http://schemas.microsoft.com/sharepoint/v3/contenttype/forms"/>
-  </ds:schemaRefs>
-</ds:datastoreItem>
-</file>
-
-<file path=customXml/itemProps3.xml><?xml version="1.0" encoding="utf-8"?>
-<ds:datastoreItem xmlns:ds="http://schemas.openxmlformats.org/officeDocument/2006/customXml" ds:itemID="{ACBA2150-0912-4867-9AC1-4627B4BB09E7}">
-  <ds:schemaRefs>
-    <ds:schemaRef ds:uri="146f35c0-5549-4b11-9385-b5bad1d7a6e6"/>
-    <ds:schemaRef ds:uri="7d18e092-22ed-4b3a-8134-bef48e64f2c3"/>
-    <ds:schemaRef ds:uri="http://purl.org/dc/dcmitype/"/>
-    <ds:schemaRef ds:uri="http://purl.org/dc/elements/1.1/"/>
-    <ds:schemaRef ds:uri="http://purl.org/dc/terms/"/>
-    <ds:schemaRef ds:uri="http://schemas.microsoft.com/office/2006/documentManagement/types"/>
-    <ds:schemaRef ds:uri="http://schemas.microsoft.com/office/2006/metadata/properties"/>
-    <ds:schemaRef ds:uri="http://schemas.microsoft.com/office/infopath/2007/PartnerControls"/>
-    <ds:schemaRef ds:uri="http://schemas.openxmlformats.org/package/2006/metadata/core-properties"/>
-    <ds:schemaRef ds:uri="http://www.w3.org/XML/1998/namespace"/>
-  </ds:schemaRefs>
-</ds:datastoreItem>
 </file>
</xml_diff>